<commit_message>
add robe and shell
</commit_message>
<xml_diff>
--- a/Docs/images.pptx
+++ b/Docs/images.pptx
@@ -4,8 +4,11 @@
   <p:sldMasterIdLst>
     <p:sldMasterId id="2147483648" r:id="rId1"/>
   </p:sldMasterIdLst>
+  <p:notesMasterIdLst>
+    <p:notesMasterId r:id="rId5"/>
+  </p:notesMasterIdLst>
   <p:sldIdLst>
-    <p:sldId id="256" r:id="rId3"/>
+    <p:sldId id="256" r:id="rId4"/>
   </p:sldIdLst>
   <p:sldSz cx="12192000" cy="6858000"/>
   <p:notesSz cx="12192000" cy="6858000"/>
@@ -107,14 +110,19 @@
 </p:presentation>
 </file>
 
-<file path=ppt/slideLayouts/slideLayout1.xml><?xml version="1.0" encoding="utf-8"?>
-<p:sldLayout xmlns:a="http://schemas.openxmlformats.org/drawingml/2006/main" xmlns:r="http://schemas.openxmlformats.org/officeDocument/2006/relationships" xmlns:p="http://schemas.openxmlformats.org/presentationml/2006/main" xmlns:m="http://schemas.openxmlformats.org/officeDocument/2006/math" xmlns:w="http://schemas.openxmlformats.org/wordprocessingml/2006/main" matchingName="" preserve="1" showMasterPhAnim="0" type="title" userDrawn="1">
-  <p:cSld name="Титульный слайд">
+<file path=ppt/notesMasters/notesMaster1.xml><?xml version="1.0" encoding="utf-8"?>
+<p:notesMaster xmlns:a="http://schemas.openxmlformats.org/drawingml/2006/main" xmlns:r="http://schemas.openxmlformats.org/officeDocument/2006/relationships" xmlns:p="http://schemas.openxmlformats.org/presentationml/2006/main">
+  <p:cSld name="">
+    <p:bg>
+      <p:bgRef idx="1001">
+        <a:schemeClr val="bg1"/>
+      </p:bgRef>
+    </p:bg>
     <p:spTree>
       <p:nvGrpSpPr>
-        <p:cNvPr id="1" name="" hidden="0"/>
+        <p:cNvPr id="1" name=""/>
         <p:cNvGrpSpPr/>
-        <p:nvPr isPhoto="0" userDrawn="0"/>
+        <p:nvPr/>
       </p:nvGrpSpPr>
       <p:grpSpPr bwMode="auto">
         <a:xfrm>
@@ -126,6 +134,403 @@
       </p:grpSpPr>
       <p:sp>
         <p:nvSpPr>
+          <p:cNvPr id="2" name="Header Placeholder 1"/>
+          <p:cNvSpPr>
+            <a:spLocks noGrp="1"/>
+          </p:cNvSpPr>
+          <p:nvPr>
+            <p:ph type="hdr" sz="quarter"/>
+          </p:nvPr>
+        </p:nvSpPr>
+        <p:spPr bwMode="auto">
+          <a:xfrm>
+            <a:off x="0" y="0"/>
+            <a:ext cx="2971800" cy="458788"/>
+          </a:xfrm>
+          <a:prstGeom prst="rect">
+            <a:avLst/>
+          </a:prstGeom>
+        </p:spPr>
+        <p:txBody>
+          <a:bodyPr vert="horz" lIns="91440" tIns="45720" rIns="91440" bIns="45720" rtlCol="0" anchor="ctr"/>
+          <a:lstStyle>
+            <a:lvl1pPr algn="l">
+              <a:defRPr sz="1200"/>
+            </a:lvl1pPr>
+          </a:lstStyle>
+          <a:p>
+            <a:pPr>
+              <a:defRPr/>
+            </a:pPr>
+            <a:endParaRPr/>
+          </a:p>
+        </p:txBody>
+      </p:sp>
+      <p:sp>
+        <p:nvSpPr>
+          <p:cNvPr id="3" name="Date Placeholder 2"/>
+          <p:cNvSpPr>
+            <a:spLocks noGrp="1"/>
+          </p:cNvSpPr>
+          <p:nvPr>
+            <p:ph type="dt" idx="2"/>
+          </p:nvPr>
+        </p:nvSpPr>
+        <p:spPr bwMode="auto">
+          <a:xfrm>
+            <a:off x="3884613" y="0"/>
+            <a:ext cx="2971800" cy="458788"/>
+          </a:xfrm>
+          <a:prstGeom prst="rect">
+            <a:avLst/>
+          </a:prstGeom>
+        </p:spPr>
+        <p:txBody>
+          <a:bodyPr vert="horz" lIns="91440" tIns="45720" rIns="91440" bIns="45720" rtlCol="0" anchor="ctr"/>
+          <a:lstStyle>
+            <a:lvl1pPr algn="r">
+              <a:defRPr sz="1200"/>
+            </a:lvl1pPr>
+          </a:lstStyle>
+          <a:p>
+            <a:pPr>
+              <a:defRPr/>
+            </a:pPr>
+            <a:endParaRPr/>
+          </a:p>
+        </p:txBody>
+      </p:sp>
+      <p:sp>
+        <p:nvSpPr>
+          <p:cNvPr id="3" name="Date Placeholder 2"/>
+          <p:cNvSpPr>
+            <a:spLocks noGrp="1"/>
+          </p:cNvSpPr>
+          <p:nvPr>
+            <p:ph type="dt" idx="3"/>
+          </p:nvPr>
+        </p:nvSpPr>
+        <p:spPr bwMode="auto">
+          <a:xfrm>
+            <a:off x="3884613" y="0"/>
+            <a:ext cx="2971800" cy="458788"/>
+          </a:xfrm>
+          <a:prstGeom prst="rect">
+            <a:avLst/>
+          </a:prstGeom>
+        </p:spPr>
+        <p:txBody>
+          <a:bodyPr vert="horz" lIns="91440" tIns="45720" rIns="91440" bIns="45720" rtlCol="0" anchor="ctr"/>
+          <a:lstStyle>
+            <a:lvl1pPr algn="r">
+              <a:defRPr sz="1200"/>
+            </a:lvl1pPr>
+          </a:lstStyle>
+          <a:p>
+            <a:pPr>
+              <a:defRPr/>
+            </a:pPr>
+            <a:endParaRPr/>
+          </a:p>
+        </p:txBody>
+      </p:sp>
+      <p:sp>
+        <p:nvSpPr>
+          <p:cNvPr id="5" name="Notes Placeholder 4"/>
+          <p:cNvSpPr>
+            <a:spLocks noGrp="1"/>
+          </p:cNvSpPr>
+          <p:nvPr>
+            <p:ph type="body" sz="quarter" idx="1"/>
+          </p:nvPr>
+        </p:nvSpPr>
+        <p:spPr bwMode="auto">
+          <a:xfrm>
+            <a:off x="685800" y="4400550"/>
+            <a:ext cx="5486400" cy="3600450"/>
+          </a:xfrm>
+          <a:prstGeom prst="rect">
+            <a:avLst/>
+          </a:prstGeom>
+        </p:spPr>
+        <p:txBody>
+          <a:bodyPr vert="horz" lIns="91440" tIns="45720" rIns="91440" bIns="45720" rtlCol="0" anchor="ctr"/>
+          <a:lstStyle/>
+          <a:p>
+            <a:pPr>
+              <a:defRPr/>
+            </a:pPr>
+            <a:endParaRPr/>
+          </a:p>
+        </p:txBody>
+      </p:sp>
+      <p:sp>
+        <p:nvSpPr>
+          <p:cNvPr id="6" name="Footer Placeholder 5"/>
+          <p:cNvSpPr>
+            <a:spLocks noGrp="1"/>
+          </p:cNvSpPr>
+          <p:nvPr>
+            <p:ph type="ftr" sz="quarter" idx="4"/>
+          </p:nvPr>
+        </p:nvSpPr>
+        <p:spPr bwMode="auto">
+          <a:xfrm>
+            <a:off x="0" y="8685213"/>
+            <a:ext cx="2971800" cy="458787"/>
+          </a:xfrm>
+          <a:prstGeom prst="rect">
+            <a:avLst/>
+          </a:prstGeom>
+        </p:spPr>
+        <p:txBody>
+          <a:bodyPr vert="horz" lIns="91440" tIns="45720" rIns="91440" bIns="45720" rtlCol="0" anchor="b"/>
+          <a:lstStyle>
+            <a:lvl1pPr algn="l">
+              <a:defRPr sz="1200"/>
+            </a:lvl1pPr>
+          </a:lstStyle>
+          <a:p>
+            <a:pPr>
+              <a:defRPr/>
+            </a:pPr>
+            <a:endParaRPr/>
+          </a:p>
+        </p:txBody>
+      </p:sp>
+      <p:sp>
+        <p:nvSpPr>
+          <p:cNvPr id="7" name="Slide Number Placeholder 6"/>
+          <p:cNvSpPr>
+            <a:spLocks noGrp="1"/>
+          </p:cNvSpPr>
+          <p:nvPr>
+            <p:ph type="sldNum" sz="quarter" idx="10"/>
+          </p:nvPr>
+        </p:nvSpPr>
+        <p:spPr bwMode="auto">
+          <a:xfrm>
+            <a:off x="3884613" y="8685213"/>
+            <a:ext cx="2971800" cy="458787"/>
+          </a:xfrm>
+          <a:prstGeom prst="rect">
+            <a:avLst/>
+          </a:prstGeom>
+        </p:spPr>
+        <p:txBody>
+          <a:bodyPr vert="horz" lIns="91440" tIns="45720" rIns="91440" bIns="45720" rtlCol="0" anchor="b"/>
+          <a:lstStyle>
+            <a:lvl1pPr algn="r">
+              <a:defRPr sz="1200"/>
+            </a:lvl1pPr>
+          </a:lstStyle>
+          <a:p>
+            <a:pPr>
+              <a:defRPr/>
+            </a:pPr>
+            <a:endParaRPr/>
+          </a:p>
+        </p:txBody>
+      </p:sp>
+    </p:spTree>
+  </p:cSld>
+  <p:clrMap bg1="lt1" tx1="dk1" bg2="lt2" tx2="dk2" accent1="accent1" accent2="accent2" accent3="accent3" accent4="accent4" accent5="accent5" accent6="accent6" hlink="hlink" folHlink="folHlink"/>
+  <p:notesStyle>
+    <a:lvl1pPr marL="0" algn="l" defTabSz="914400">
+      <a:defRPr sz="1200">
+        <a:solidFill>
+          <a:schemeClr val="tx1"/>
+        </a:solidFill>
+        <a:latin typeface="+mn-lt"/>
+        <a:ea typeface="+mn-ea"/>
+        <a:cs typeface="+mn-cs"/>
+      </a:defRPr>
+    </a:lvl1pPr>
+    <a:lvl2pPr marL="457200" algn="l" defTabSz="914400">
+      <a:defRPr sz="1200">
+        <a:solidFill>
+          <a:schemeClr val="tx1"/>
+        </a:solidFill>
+        <a:latin typeface="+mn-lt"/>
+        <a:ea typeface="+mn-ea"/>
+        <a:cs typeface="+mn-cs"/>
+      </a:defRPr>
+    </a:lvl2pPr>
+    <a:lvl3pPr marL="914400" algn="l" defTabSz="914400">
+      <a:defRPr sz="1200">
+        <a:solidFill>
+          <a:schemeClr val="tx1"/>
+        </a:solidFill>
+        <a:latin typeface="+mn-lt"/>
+        <a:ea typeface="+mn-ea"/>
+        <a:cs typeface="+mn-cs"/>
+      </a:defRPr>
+    </a:lvl3pPr>
+    <a:lvl4pPr marL="1371600" algn="l" defTabSz="914400">
+      <a:defRPr sz="1200">
+        <a:solidFill>
+          <a:schemeClr val="tx1"/>
+        </a:solidFill>
+        <a:latin typeface="+mn-lt"/>
+        <a:ea typeface="+mn-ea"/>
+        <a:cs typeface="+mn-cs"/>
+      </a:defRPr>
+    </a:lvl4pPr>
+    <a:lvl5pPr marL="1828800" algn="l" defTabSz="914400">
+      <a:defRPr sz="1200">
+        <a:solidFill>
+          <a:schemeClr val="tx1"/>
+        </a:solidFill>
+        <a:latin typeface="+mn-lt"/>
+        <a:ea typeface="+mn-ea"/>
+        <a:cs typeface="+mn-cs"/>
+      </a:defRPr>
+    </a:lvl5pPr>
+    <a:lvl6pPr marL="2286000" algn="l" defTabSz="914400">
+      <a:defRPr sz="1200">
+        <a:solidFill>
+          <a:schemeClr val="tx1"/>
+        </a:solidFill>
+        <a:latin typeface="+mn-lt"/>
+        <a:ea typeface="+mn-ea"/>
+        <a:cs typeface="+mn-cs"/>
+      </a:defRPr>
+    </a:lvl6pPr>
+    <a:lvl7pPr marL="2743200" algn="l" defTabSz="914400">
+      <a:defRPr sz="1200">
+        <a:solidFill>
+          <a:schemeClr val="tx1"/>
+        </a:solidFill>
+        <a:latin typeface="+mn-lt"/>
+        <a:ea typeface="+mn-ea"/>
+        <a:cs typeface="+mn-cs"/>
+      </a:defRPr>
+    </a:lvl7pPr>
+    <a:lvl8pPr marL="3200400" algn="l" defTabSz="914400">
+      <a:defRPr sz="1200">
+        <a:solidFill>
+          <a:schemeClr val="tx1"/>
+        </a:solidFill>
+        <a:latin typeface="+mn-lt"/>
+        <a:ea typeface="+mn-ea"/>
+        <a:cs typeface="+mn-cs"/>
+      </a:defRPr>
+    </a:lvl8pPr>
+    <a:lvl9pPr marL="3657600" algn="l" defTabSz="914400">
+      <a:defRPr sz="1200">
+        <a:solidFill>
+          <a:schemeClr val="tx1"/>
+        </a:solidFill>
+        <a:latin typeface="+mn-lt"/>
+        <a:ea typeface="+mn-ea"/>
+        <a:cs typeface="+mn-cs"/>
+      </a:defRPr>
+    </a:lvl9pPr>
+  </p:notesStyle>
+</p:notesMaster>
+</file>
+
+<file path=ppt/notesSlides/notesSlide1.xml><?xml version="1.0" encoding="utf-8"?>
+<p:notes xmlns:a="http://schemas.openxmlformats.org/drawingml/2006/main" xmlns:r="http://schemas.openxmlformats.org/officeDocument/2006/relationships" xmlns:p="http://schemas.openxmlformats.org/presentationml/2006/main" xmlns:m="http://schemas.openxmlformats.org/officeDocument/2006/math" xmlns:w="http://schemas.openxmlformats.org/wordprocessingml/2006/main">
+  <p:cSld name="">
+    <p:spTree>
+      <p:nvGrpSpPr>
+        <p:cNvPr id="1" name=""/>
+        <p:cNvGrpSpPr/>
+        <p:nvPr/>
+      </p:nvGrpSpPr>
+      <p:grpSpPr bwMode="auto">
+        <a:xfrm>
+          <a:off x="0" y="0"/>
+          <a:ext cx="0" cy="0"/>
+          <a:chOff x="0" y="0"/>
+          <a:chExt cx="0" cy="0"/>
+        </a:xfrm>
+      </p:grpSpPr>
+      <p:sp>
+        <p:nvSpPr>
+          <p:cNvPr id="2" name="Slide Image Placeholder 1"/>
+          <p:cNvSpPr>
+            <a:spLocks noChangeAspect="1" noGrp="1" noRot="1"/>
+          </p:cNvSpPr>
+          <p:nvPr>
+            <p:ph type="sldImg"/>
+          </p:nvPr>
+        </p:nvSpPr>
+        <p:spPr bwMode="auto"/>
+      </p:sp>
+      <p:sp>
+        <p:nvSpPr>
+          <p:cNvPr id="3" name="Notes Placeholder 2"/>
+          <p:cNvSpPr>
+            <a:spLocks noGrp="1"/>
+          </p:cNvSpPr>
+          <p:nvPr>
+            <p:ph type="body" idx="1"/>
+          </p:nvPr>
+        </p:nvSpPr>
+        <p:spPr bwMode="auto"/>
+        <p:txBody>
+          <a:bodyPr/>
+          <a:lstStyle/>
+          <a:p>
+            <a:pPr>
+              <a:defRPr/>
+            </a:pPr>
+            <a:endParaRPr/>
+          </a:p>
+        </p:txBody>
+      </p:sp>
+      <p:sp>
+        <p:nvSpPr>
+          <p:cNvPr id="4" name="Slide Number Placeholder 3"/>
+          <p:cNvSpPr>
+            <a:spLocks noGrp="1"/>
+          </p:cNvSpPr>
+          <p:nvPr>
+            <p:ph type="sldNum" sz="quarter" idx="10"/>
+          </p:nvPr>
+        </p:nvSpPr>
+        <p:spPr bwMode="auto"/>
+        <p:txBody>
+          <a:bodyPr/>
+          <a:lstStyle/>
+          <a:p>
+            <a:pPr>
+              <a:defRPr/>
+            </a:pPr>
+            <a:fld id="{9685527F-7C02-B462-F739-A22144AC419E}" type="slidenum">
+              <a:rPr/>
+              <a:t/>
+            </a:fld>
+            <a:endParaRPr/>
+          </a:p>
+        </p:txBody>
+      </p:sp>
+    </p:spTree>
+  </p:cSld>
+</p:notes>
+</file>
+
+<file path=ppt/slideLayouts/slideLayout1.xml><?xml version="1.0" encoding="utf-8"?>
+<p:sldLayout xmlns:a="http://schemas.openxmlformats.org/drawingml/2006/main" xmlns:r="http://schemas.openxmlformats.org/officeDocument/2006/relationships" xmlns:p="http://schemas.openxmlformats.org/presentationml/2006/main" xmlns:m="http://schemas.openxmlformats.org/officeDocument/2006/math" xmlns:w="http://schemas.openxmlformats.org/wordprocessingml/2006/main" matchingName="" preserve="1" showMasterPhAnim="0" showMasterSp="1" type="title" userDrawn="1">
+  <p:cSld name="Титульный слайд">
+    <p:spTree>
+      <p:nvGrpSpPr>
+        <p:cNvPr id="1" name=""/>
+        <p:cNvGrpSpPr/>
+        <p:nvPr/>
+      </p:nvGrpSpPr>
+      <p:grpSpPr bwMode="auto">
+        <a:xfrm>
+          <a:off x="0" y="0"/>
+          <a:ext cx="0" cy="0"/>
+          <a:chOff x="0" y="0"/>
+          <a:chExt cx="0" cy="0"/>
+        </a:xfrm>
+      </p:grpSpPr>
+      <p:sp>
+        <p:nvSpPr>
           <p:cNvPr id="2" name="Заголовок 1" hidden="0"/>
           <p:cNvSpPr>
             <a:spLocks noGrp="1"/>
@@ -310,13 +715,13 @@
 </file>
 
 <file path=ppt/slideLayouts/slideLayout10.xml><?xml version="1.0" encoding="utf-8"?>
-<p:sldLayout xmlns:a="http://schemas.openxmlformats.org/drawingml/2006/main" xmlns:r="http://schemas.openxmlformats.org/officeDocument/2006/relationships" xmlns:p="http://schemas.openxmlformats.org/presentationml/2006/main" xmlns:m="http://schemas.openxmlformats.org/officeDocument/2006/math" xmlns:w="http://schemas.openxmlformats.org/wordprocessingml/2006/main" matchingName="" preserve="1" showMasterPhAnim="0" type="vertTx" userDrawn="1">
+<p:sldLayout xmlns:a="http://schemas.openxmlformats.org/drawingml/2006/main" xmlns:r="http://schemas.openxmlformats.org/officeDocument/2006/relationships" xmlns:p="http://schemas.openxmlformats.org/presentationml/2006/main" xmlns:m="http://schemas.openxmlformats.org/officeDocument/2006/math" xmlns:w="http://schemas.openxmlformats.org/wordprocessingml/2006/main" matchingName="" preserve="1" showMasterPhAnim="0" showMasterSp="1" type="vertTx" userDrawn="1">
   <p:cSld name="Заголовок и вертикальный текст">
     <p:spTree>
       <p:nvGrpSpPr>
-        <p:cNvPr id="1" name="" hidden="0"/>
+        <p:cNvPr id="1" name=""/>
         <p:cNvGrpSpPr/>
-        <p:nvPr isPhoto="0" userDrawn="0"/>
+        <p:nvPr/>
       </p:nvGrpSpPr>
       <p:grpSpPr bwMode="auto">
         <a:xfrm>
@@ -501,13 +906,13 @@
 </file>
 
 <file path=ppt/slideLayouts/slideLayout11.xml><?xml version="1.0" encoding="utf-8"?>
-<p:sldLayout xmlns:a="http://schemas.openxmlformats.org/drawingml/2006/main" xmlns:r="http://schemas.openxmlformats.org/officeDocument/2006/relationships" xmlns:p="http://schemas.openxmlformats.org/presentationml/2006/main" xmlns:m="http://schemas.openxmlformats.org/officeDocument/2006/math" xmlns:w="http://schemas.openxmlformats.org/wordprocessingml/2006/main" matchingName="" preserve="1" showMasterPhAnim="0" type="vertTitleAndTx" userDrawn="1">
+<p:sldLayout xmlns:a="http://schemas.openxmlformats.org/drawingml/2006/main" xmlns:r="http://schemas.openxmlformats.org/officeDocument/2006/relationships" xmlns:p="http://schemas.openxmlformats.org/presentationml/2006/main" xmlns:m="http://schemas.openxmlformats.org/officeDocument/2006/math" xmlns:w="http://schemas.openxmlformats.org/wordprocessingml/2006/main" matchingName="" preserve="1" showMasterPhAnim="0" showMasterSp="1" type="vertTitleAndTx" userDrawn="1">
   <p:cSld name="Вертикальный заголовок и текст">
     <p:spTree>
       <p:nvGrpSpPr>
-        <p:cNvPr id="1" name="" hidden="0"/>
+        <p:cNvPr id="1" name=""/>
         <p:cNvGrpSpPr/>
-        <p:nvPr isPhoto="0" userDrawn="0"/>
+        <p:nvPr/>
       </p:nvGrpSpPr>
       <p:grpSpPr bwMode="auto">
         <a:xfrm>
@@ -702,13 +1107,13 @@
 </file>
 
 <file path=ppt/slideLayouts/slideLayout2.xml><?xml version="1.0" encoding="utf-8"?>
-<p:sldLayout xmlns:a="http://schemas.openxmlformats.org/drawingml/2006/main" xmlns:r="http://schemas.openxmlformats.org/officeDocument/2006/relationships" xmlns:p="http://schemas.openxmlformats.org/presentationml/2006/main" xmlns:m="http://schemas.openxmlformats.org/officeDocument/2006/math" xmlns:w="http://schemas.openxmlformats.org/wordprocessingml/2006/main" matchingName="" preserve="1" showMasterPhAnim="0" type="obj" userDrawn="1">
+<p:sldLayout xmlns:a="http://schemas.openxmlformats.org/drawingml/2006/main" xmlns:r="http://schemas.openxmlformats.org/officeDocument/2006/relationships" xmlns:p="http://schemas.openxmlformats.org/presentationml/2006/main" xmlns:m="http://schemas.openxmlformats.org/officeDocument/2006/math" xmlns:w="http://schemas.openxmlformats.org/wordprocessingml/2006/main" matchingName="" preserve="1" showMasterPhAnim="0" showMasterSp="1" type="obj" userDrawn="1">
   <p:cSld name="Заголовок и объект">
     <p:spTree>
       <p:nvGrpSpPr>
-        <p:cNvPr id="1" name="" hidden="0"/>
+        <p:cNvPr id="1" name=""/>
         <p:cNvGrpSpPr/>
-        <p:nvPr isPhoto="0" userDrawn="0"/>
+        <p:nvPr/>
       </p:nvGrpSpPr>
       <p:grpSpPr bwMode="auto">
         <a:xfrm>
@@ -893,13 +1298,13 @@
 </file>
 
 <file path=ppt/slideLayouts/slideLayout3.xml><?xml version="1.0" encoding="utf-8"?>
-<p:sldLayout xmlns:a="http://schemas.openxmlformats.org/drawingml/2006/main" xmlns:r="http://schemas.openxmlformats.org/officeDocument/2006/relationships" xmlns:p="http://schemas.openxmlformats.org/presentationml/2006/main" xmlns:m="http://schemas.openxmlformats.org/officeDocument/2006/math" xmlns:w="http://schemas.openxmlformats.org/wordprocessingml/2006/main" matchingName="" preserve="1" showMasterPhAnim="0" type="secHead" userDrawn="1">
+<p:sldLayout xmlns:a="http://schemas.openxmlformats.org/drawingml/2006/main" xmlns:r="http://schemas.openxmlformats.org/officeDocument/2006/relationships" xmlns:p="http://schemas.openxmlformats.org/presentationml/2006/main" xmlns:m="http://schemas.openxmlformats.org/officeDocument/2006/math" xmlns:w="http://schemas.openxmlformats.org/wordprocessingml/2006/main" matchingName="" preserve="1" showMasterPhAnim="0" showMasterSp="1" type="secHead" userDrawn="1">
   <p:cSld name="Заголовок раздела">
     <p:spTree>
       <p:nvGrpSpPr>
-        <p:cNvPr id="1" name="" hidden="0"/>
+        <p:cNvPr id="1" name=""/>
         <p:cNvGrpSpPr/>
-        <p:nvPr isPhoto="0" userDrawn="0"/>
+        <p:nvPr/>
       </p:nvGrpSpPr>
       <p:grpSpPr bwMode="auto">
         <a:xfrm>
@@ -1149,13 +1554,13 @@
 </file>
 
 <file path=ppt/slideLayouts/slideLayout4.xml><?xml version="1.0" encoding="utf-8"?>
-<p:sldLayout xmlns:a="http://schemas.openxmlformats.org/drawingml/2006/main" xmlns:r="http://schemas.openxmlformats.org/officeDocument/2006/relationships" xmlns:p="http://schemas.openxmlformats.org/presentationml/2006/main" xmlns:m="http://schemas.openxmlformats.org/officeDocument/2006/math" xmlns:w="http://schemas.openxmlformats.org/wordprocessingml/2006/main" matchingName="" preserve="1" showMasterPhAnim="0" type="twoObj" userDrawn="1">
+<p:sldLayout xmlns:a="http://schemas.openxmlformats.org/drawingml/2006/main" xmlns:r="http://schemas.openxmlformats.org/officeDocument/2006/relationships" xmlns:p="http://schemas.openxmlformats.org/presentationml/2006/main" xmlns:m="http://schemas.openxmlformats.org/officeDocument/2006/math" xmlns:w="http://schemas.openxmlformats.org/wordprocessingml/2006/main" matchingName="" preserve="1" showMasterPhAnim="0" showMasterSp="1" type="twoObj" userDrawn="1">
   <p:cSld name="Два объекта">
     <p:spTree>
       <p:nvGrpSpPr>
-        <p:cNvPr id="1" name="" hidden="0"/>
+        <p:cNvPr id="1" name=""/>
         <p:cNvGrpSpPr/>
-        <p:nvPr isPhoto="0" userDrawn="0"/>
+        <p:nvPr/>
       </p:nvGrpSpPr>
       <p:grpSpPr bwMode="auto">
         <a:xfrm>
@@ -1416,13 +1821,13 @@
 </file>
 
 <file path=ppt/slideLayouts/slideLayout5.xml><?xml version="1.0" encoding="utf-8"?>
-<p:sldLayout xmlns:a="http://schemas.openxmlformats.org/drawingml/2006/main" xmlns:r="http://schemas.openxmlformats.org/officeDocument/2006/relationships" xmlns:p="http://schemas.openxmlformats.org/presentationml/2006/main" xmlns:m="http://schemas.openxmlformats.org/officeDocument/2006/math" xmlns:w="http://schemas.openxmlformats.org/wordprocessingml/2006/main" matchingName="" preserve="1" showMasterPhAnim="0" type="twoTxTwoObj" userDrawn="1">
+<p:sldLayout xmlns:a="http://schemas.openxmlformats.org/drawingml/2006/main" xmlns:r="http://schemas.openxmlformats.org/officeDocument/2006/relationships" xmlns:p="http://schemas.openxmlformats.org/presentationml/2006/main" xmlns:m="http://schemas.openxmlformats.org/officeDocument/2006/math" xmlns:w="http://schemas.openxmlformats.org/wordprocessingml/2006/main" matchingName="" preserve="1" showMasterPhAnim="0" showMasterSp="1" type="twoTxTwoObj" userDrawn="1">
   <p:cSld name="Сравнение">
     <p:spTree>
       <p:nvGrpSpPr>
-        <p:cNvPr id="1" name="" hidden="0"/>
+        <p:cNvPr id="1" name=""/>
         <p:cNvGrpSpPr/>
-        <p:nvPr isPhoto="0" userDrawn="0"/>
+        <p:nvPr/>
       </p:nvGrpSpPr>
       <p:grpSpPr bwMode="auto">
         <a:xfrm>
@@ -1824,13 +2229,13 @@
 </file>
 
 <file path=ppt/slideLayouts/slideLayout6.xml><?xml version="1.0" encoding="utf-8"?>
-<p:sldLayout xmlns:a="http://schemas.openxmlformats.org/drawingml/2006/main" xmlns:r="http://schemas.openxmlformats.org/officeDocument/2006/relationships" xmlns:p="http://schemas.openxmlformats.org/presentationml/2006/main" xmlns:m="http://schemas.openxmlformats.org/officeDocument/2006/math" xmlns:w="http://schemas.openxmlformats.org/wordprocessingml/2006/main" matchingName="" preserve="1" showMasterPhAnim="0" type="titleOnly" userDrawn="1">
+<p:sldLayout xmlns:a="http://schemas.openxmlformats.org/drawingml/2006/main" xmlns:r="http://schemas.openxmlformats.org/officeDocument/2006/relationships" xmlns:p="http://schemas.openxmlformats.org/presentationml/2006/main" xmlns:m="http://schemas.openxmlformats.org/officeDocument/2006/math" xmlns:w="http://schemas.openxmlformats.org/wordprocessingml/2006/main" matchingName="" preserve="1" showMasterPhAnim="0" showMasterSp="1" type="titleOnly" userDrawn="1">
   <p:cSld name="Только заголовок">
     <p:spTree>
       <p:nvGrpSpPr>
-        <p:cNvPr id="1" name="" hidden="0"/>
+        <p:cNvPr id="1" name=""/>
         <p:cNvGrpSpPr/>
-        <p:nvPr isPhoto="0" userDrawn="0"/>
+        <p:nvPr/>
       </p:nvGrpSpPr>
       <p:grpSpPr bwMode="auto">
         <a:xfrm>
@@ -1949,13 +2354,13 @@
 </file>
 
 <file path=ppt/slideLayouts/slideLayout7.xml><?xml version="1.0" encoding="utf-8"?>
-<p:sldLayout xmlns:a="http://schemas.openxmlformats.org/drawingml/2006/main" xmlns:r="http://schemas.openxmlformats.org/officeDocument/2006/relationships" xmlns:p="http://schemas.openxmlformats.org/presentationml/2006/main" xmlns:m="http://schemas.openxmlformats.org/officeDocument/2006/math" xmlns:w="http://schemas.openxmlformats.org/wordprocessingml/2006/main" matchingName="" preserve="1" showMasterPhAnim="0" type="blank" userDrawn="1">
+<p:sldLayout xmlns:a="http://schemas.openxmlformats.org/drawingml/2006/main" xmlns:r="http://schemas.openxmlformats.org/officeDocument/2006/relationships" xmlns:p="http://schemas.openxmlformats.org/presentationml/2006/main" xmlns:m="http://schemas.openxmlformats.org/officeDocument/2006/math" xmlns:w="http://schemas.openxmlformats.org/wordprocessingml/2006/main" matchingName="" preserve="1" showMasterPhAnim="0" showMasterSp="1" type="blank" userDrawn="1">
   <p:cSld name="Пустой слайд">
     <p:spTree>
       <p:nvGrpSpPr>
-        <p:cNvPr id="1" name="" hidden="0"/>
+        <p:cNvPr id="1" name=""/>
         <p:cNvGrpSpPr/>
-        <p:nvPr isPhoto="0" userDrawn="0"/>
+        <p:nvPr/>
       </p:nvGrpSpPr>
       <p:grpSpPr bwMode="auto">
         <a:xfrm>
@@ -2048,13 +2453,13 @@
 </file>
 
 <file path=ppt/slideLayouts/slideLayout8.xml><?xml version="1.0" encoding="utf-8"?>
-<p:sldLayout xmlns:a="http://schemas.openxmlformats.org/drawingml/2006/main" xmlns:r="http://schemas.openxmlformats.org/officeDocument/2006/relationships" xmlns:p="http://schemas.openxmlformats.org/presentationml/2006/main" xmlns:m="http://schemas.openxmlformats.org/officeDocument/2006/math" xmlns:w="http://schemas.openxmlformats.org/wordprocessingml/2006/main" matchingName="" preserve="1" showMasterPhAnim="0" type="objTx" userDrawn="1">
+<p:sldLayout xmlns:a="http://schemas.openxmlformats.org/drawingml/2006/main" xmlns:r="http://schemas.openxmlformats.org/officeDocument/2006/relationships" xmlns:p="http://schemas.openxmlformats.org/presentationml/2006/main" xmlns:m="http://schemas.openxmlformats.org/officeDocument/2006/math" xmlns:w="http://schemas.openxmlformats.org/wordprocessingml/2006/main" matchingName="" preserve="1" showMasterPhAnim="0" showMasterSp="1" type="objTx" userDrawn="1">
   <p:cSld name="Объект с подписью">
     <p:spTree>
       <p:nvGrpSpPr>
-        <p:cNvPr id="1" name="" hidden="0"/>
+        <p:cNvPr id="1" name=""/>
         <p:cNvGrpSpPr/>
-        <p:nvPr isPhoto="0" userDrawn="0"/>
+        <p:nvPr/>
       </p:nvGrpSpPr>
       <p:grpSpPr bwMode="auto">
         <a:xfrm>
@@ -2349,13 +2754,13 @@
 </file>
 
 <file path=ppt/slideLayouts/slideLayout9.xml><?xml version="1.0" encoding="utf-8"?>
-<p:sldLayout xmlns:a="http://schemas.openxmlformats.org/drawingml/2006/main" xmlns:r="http://schemas.openxmlformats.org/officeDocument/2006/relationships" xmlns:p="http://schemas.openxmlformats.org/presentationml/2006/main" xmlns:m="http://schemas.openxmlformats.org/officeDocument/2006/math" xmlns:w="http://schemas.openxmlformats.org/wordprocessingml/2006/main" matchingName="" preserve="1" showMasterPhAnim="0" type="picTx" userDrawn="1">
+<p:sldLayout xmlns:a="http://schemas.openxmlformats.org/drawingml/2006/main" xmlns:r="http://schemas.openxmlformats.org/officeDocument/2006/relationships" xmlns:p="http://schemas.openxmlformats.org/presentationml/2006/main" xmlns:m="http://schemas.openxmlformats.org/officeDocument/2006/math" xmlns:w="http://schemas.openxmlformats.org/wordprocessingml/2006/main" matchingName="" preserve="1" showMasterPhAnim="0" showMasterSp="1" type="picTx" userDrawn="1">
   <p:cSld name="Рисунок с подписью">
     <p:spTree>
       <p:nvGrpSpPr>
-        <p:cNvPr id="1" name="" hidden="0"/>
+        <p:cNvPr id="1" name=""/>
         <p:cNvGrpSpPr/>
-        <p:nvPr isPhoto="0" userDrawn="0"/>
+        <p:nvPr/>
       </p:nvGrpSpPr>
       <p:grpSpPr bwMode="auto">
         <a:xfrm>
@@ -2628,9 +3033,9 @@
     </p:bg>
     <p:spTree>
       <p:nvGrpSpPr>
-        <p:cNvPr id="1" name="" hidden="0"/>
+        <p:cNvPr id="1" name=""/>
         <p:cNvGrpSpPr/>
-        <p:nvPr isPhoto="0" userDrawn="0"/>
+        <p:nvPr/>
       </p:nvGrpSpPr>
       <p:grpSpPr bwMode="auto">
         <a:xfrm>
@@ -3180,7 +3585,7 @@
 </file>
 
 <file path=ppt/slides/slide1.xml><?xml version="1.0" encoding="utf-8"?>
-<p:sld xmlns:a="http://schemas.openxmlformats.org/drawingml/2006/main" xmlns:r="http://schemas.openxmlformats.org/officeDocument/2006/relationships" xmlns:p="http://schemas.openxmlformats.org/presentationml/2006/main" xmlns:m="http://schemas.openxmlformats.org/officeDocument/2006/math" xmlns:w="http://schemas.openxmlformats.org/wordprocessingml/2006/main" showMasterPhAnim="0" show="1">
+<p:sld xmlns:a="http://schemas.openxmlformats.org/drawingml/2006/main" xmlns:r="http://schemas.openxmlformats.org/officeDocument/2006/relationships" xmlns:p="http://schemas.openxmlformats.org/presentationml/2006/main" xmlns:m="http://schemas.openxmlformats.org/officeDocument/2006/math" xmlns:w="http://schemas.openxmlformats.org/wordprocessingml/2006/main" xmlns:mc="http://schemas.openxmlformats.org/markup-compatibility/2006" showMasterPhAnim="0" showMasterSp="1" show="1">
   <p:cSld name="">
     <p:bg>
       <p:bgPr shadeToTitle="0">
@@ -3191,9 +3596,9 @@
     </p:bg>
     <p:spTree>
       <p:nvGrpSpPr>
-        <p:cNvPr id="1" name="" hidden="0"/>
+        <p:cNvPr id="1" name=""/>
         <p:cNvGrpSpPr/>
-        <p:nvPr isPhoto="0" userDrawn="0"/>
+        <p:nvPr/>
       </p:nvGrpSpPr>
       <p:grpSpPr bwMode="auto">
         <a:xfrm>
@@ -3272,7 +3677,7 @@
                 <a:ea typeface="Ubuntu"/>
                 <a:cs typeface="Ubuntu"/>
               </a:rPr>
-              <a:t>v1.4</a:t>
+              <a:t>v1.5</a:t>
             </a:r>
             <a:endParaRPr sz="4800" b="1" i="0" u="none" strike="noStrike" cap="none" spc="0">
               <a:solidFill>
@@ -3294,12 +3699,12 @@
           <p:nvPr isPhoto="0" userDrawn="0"/>
         </p:nvPicPr>
         <p:blipFill>
-          <a:blip r:embed="rId2"/>
+          <a:blip r:embed="rId3"/>
           <a:stretch/>
         </p:blipFill>
         <p:spPr bwMode="auto">
           <a:xfrm flipH="0" flipV="0">
-            <a:off x="1603409" y="1512639"/>
+            <a:off x="1603408" y="1512639"/>
             <a:ext cx="8976590" cy="1276322"/>
           </a:xfrm>
           <a:prstGeom prst="rect">
@@ -3313,7 +3718,7 @@
     <a:masterClrMapping/>
   </p:clrMapOvr>
   <mc:AlternateContent xmlns:mc="http://schemas.openxmlformats.org/markup-compatibility/2006">
-    <mc:Choice xmlns:p14="http://schemas.microsoft.com/office/powerpoint/2010/main" Requires="p14">
+    <mc:Choice xmlns:p159="http://schemas.microsoft.com/office/powerpoint/2015/09/main" xmlns:p14="http://schemas.microsoft.com/office/powerpoint/2010/main" Requires="p159">
       <p:transition p14:dur="2000" advClick="1"/>
     </mc:Choice>
     <mc:Fallback>
@@ -3528,4 +3933,211 @@
   </a:themeElements>
   <a:objectDefaults/>
 </a:theme>
+</file>
+
+<file path=ppt/theme/theme2.xml><?xml version="1.0" encoding="utf-8"?>
+<a:theme xmlns:a="http://schemas.openxmlformats.org/drawingml/2006/main" xmlns:r="http://schemas.openxmlformats.org/officeDocument/2006/relationships" xmlns:p="http://schemas.openxmlformats.org/presentationml/2006/main" name="Office Theme">
+  <a:themeElements>
+    <a:clrScheme name="New Office">
+      <a:dk1>
+        <a:sysClr val="windowText" lastClr="000000"/>
+      </a:dk1>
+      <a:lt1>
+        <a:sysClr val="window" lastClr="FFFFFF"/>
+      </a:lt1>
+      <a:dk2>
+        <a:srgbClr val="44546A"/>
+      </a:dk2>
+      <a:lt2>
+        <a:srgbClr val="E7E6E6"/>
+      </a:lt2>
+      <a:accent1>
+        <a:srgbClr val="5B9BD5"/>
+      </a:accent1>
+      <a:accent2>
+        <a:srgbClr val="ED7D31"/>
+      </a:accent2>
+      <a:accent3>
+        <a:srgbClr val="A5A5A5"/>
+      </a:accent3>
+      <a:accent4>
+        <a:srgbClr val="FFC000"/>
+      </a:accent4>
+      <a:accent5>
+        <a:srgbClr val="4472C4"/>
+      </a:accent5>
+      <a:accent6>
+        <a:srgbClr val="70AD47"/>
+      </a:accent6>
+      <a:hlink>
+        <a:srgbClr val="0563C1"/>
+      </a:hlink>
+      <a:folHlink>
+        <a:srgbClr val="954F72"/>
+      </a:folHlink>
+    </a:clrScheme>
+    <a:fontScheme name="">
+      <a:majorFont>
+        <a:latin typeface="Arial"/>
+        <a:ea typeface="Arial"/>
+        <a:cs typeface="Arial"/>
+      </a:majorFont>
+      <a:minorFont>
+        <a:latin typeface="Arial"/>
+        <a:ea typeface="Arial"/>
+        <a:cs typeface="Arial"/>
+      </a:minorFont>
+    </a:fontScheme>
+    <a:fmtScheme name="Office Theme">
+      <a:fillStyleLst>
+        <a:solidFill>
+          <a:schemeClr val="phClr"/>
+        </a:solidFill>
+        <a:gradFill>
+          <a:gsLst>
+            <a:gs pos="0">
+              <a:schemeClr val="phClr">
+                <a:lumMod val="110000"/>
+                <a:satMod val="105000"/>
+                <a:tint val="67000"/>
+              </a:schemeClr>
+            </a:gs>
+            <a:gs pos="50000">
+              <a:schemeClr val="phClr">
+                <a:lumMod val="105000"/>
+                <a:satMod val="103000"/>
+                <a:tint val="73000"/>
+              </a:schemeClr>
+            </a:gs>
+            <a:gs pos="100000">
+              <a:schemeClr val="phClr">
+                <a:lumMod val="105000"/>
+                <a:satMod val="109000"/>
+                <a:tint val="81000"/>
+              </a:schemeClr>
+            </a:gs>
+          </a:gsLst>
+          <a:lin ang="5400000" scaled="0"/>
+        </a:gradFill>
+        <a:gradFill>
+          <a:gsLst>
+            <a:gs pos="0">
+              <a:schemeClr val="phClr">
+                <a:satMod val="103000"/>
+                <a:lumMod val="102000"/>
+                <a:tint val="94000"/>
+              </a:schemeClr>
+            </a:gs>
+            <a:gs pos="50000">
+              <a:schemeClr val="phClr">
+                <a:satMod val="110000"/>
+                <a:lumMod val="100000"/>
+                <a:shade val="100000"/>
+              </a:schemeClr>
+            </a:gs>
+            <a:gs pos="100000">
+              <a:schemeClr val="phClr">
+                <a:lumMod val="99000"/>
+                <a:satMod val="120000"/>
+                <a:shade val="78000"/>
+              </a:schemeClr>
+            </a:gs>
+          </a:gsLst>
+          <a:lin ang="5400000" scaled="0"/>
+        </a:gradFill>
+      </a:fillStyleLst>
+      <a:lnStyleLst>
+        <a:ln w="6350" cap="flat" cmpd="sng" algn="ctr">
+          <a:solidFill>
+            <a:schemeClr val="phClr"/>
+          </a:solidFill>
+          <a:prstDash val="solid"/>
+          <a:miter lim="800000"/>
+        </a:ln>
+        <a:ln w="12700" cap="flat" cmpd="sng" algn="ctr">
+          <a:solidFill>
+            <a:schemeClr val="phClr"/>
+          </a:solidFill>
+          <a:prstDash val="solid"/>
+          <a:miter lim="800000"/>
+        </a:ln>
+        <a:ln w="19050" cap="flat" cmpd="sng" algn="ctr">
+          <a:solidFill>
+            <a:schemeClr val="phClr"/>
+          </a:solidFill>
+          <a:prstDash val="solid"/>
+          <a:miter lim="800000"/>
+        </a:ln>
+      </a:lnStyleLst>
+      <a:effectStyleLst>
+        <a:effectStyle>
+          <a:effectLst>
+            <a:outerShdw blurRad="40000" dist="20000" dir="5400000" rotWithShape="0">
+              <a:srgbClr val="000000">
+                <a:alpha val="38000"/>
+              </a:srgbClr>
+            </a:outerShdw>
+          </a:effectLst>
+        </a:effectStyle>
+        <a:effectStyle>
+          <a:effectLst>
+            <a:outerShdw blurRad="40000" dist="23000" dir="5400000" rotWithShape="0">
+              <a:srgbClr val="000000">
+                <a:alpha val="35000"/>
+              </a:srgbClr>
+            </a:outerShdw>
+          </a:effectLst>
+        </a:effectStyle>
+        <a:effectStyle>
+          <a:effectLst>
+            <a:outerShdw blurRad="40000" dist="23000" dir="5400000" rotWithShape="0">
+              <a:srgbClr val="000000">
+                <a:alpha val="35000"/>
+              </a:srgbClr>
+            </a:outerShdw>
+          </a:effectLst>
+        </a:effectStyle>
+      </a:effectStyleLst>
+      <a:bgFillStyleLst>
+        <a:solidFill>
+          <a:schemeClr val="phClr"/>
+        </a:solidFill>
+        <a:solidFill>
+          <a:schemeClr val="phClr">
+            <a:tint val="95000"/>
+            <a:satMod val="170000"/>
+          </a:schemeClr>
+        </a:solidFill>
+        <a:gradFill>
+          <a:gsLst>
+            <a:gs pos="0">
+              <a:schemeClr val="phClr">
+                <a:tint val="93000"/>
+                <a:satMod val="150000"/>
+                <a:shade val="98000"/>
+                <a:lumMod val="102000"/>
+              </a:schemeClr>
+            </a:gs>
+            <a:gs pos="50000">
+              <a:schemeClr val="phClr">
+                <a:tint val="98000"/>
+                <a:satMod val="130000"/>
+                <a:shade val="90000"/>
+                <a:lumMod val="103000"/>
+              </a:schemeClr>
+            </a:gs>
+            <a:gs pos="100000">
+              <a:schemeClr val="phClr">
+                <a:shade val="63000"/>
+                <a:satMod val="120000"/>
+              </a:schemeClr>
+            </a:gs>
+          </a:gsLst>
+          <a:lin ang="5400000" scaled="0"/>
+        </a:gradFill>
+      </a:bgFillStyleLst>
+    </a:fmtScheme>
+  </a:themeElements>
+  <a:objectDefaults/>
+</a:theme>
 </file>
</xml_diff>